<commit_message>
ppt and wgan mnist v2
</commit_message>
<xml_diff>
--- a/Evaluating DDIMs in New Domains.pptx
+++ b/Evaluating DDIMs in New Domains.pptx
@@ -2,7 +2,7 @@
 <file path=ppt/presentation.xml><?xml version="1.0" encoding="utf-8"?>
 <p:presentation xmlns:a="http://schemas.openxmlformats.org/drawingml/2006/main" xmlns:r="http://schemas.openxmlformats.org/officeDocument/2006/relationships" xmlns:p="http://schemas.openxmlformats.org/presentationml/2006/main" saveSubsetFonts="1">
   <p:sldMasterIdLst>
-    <p:sldMasterId id="2147483648" r:id="rId1"/>
+    <p:sldMasterId id="2147483846" r:id="rId1"/>
   </p:sldMasterIdLst>
   <p:notesMasterIdLst>
     <p:notesMasterId r:id="rId10"/>
@@ -204,7 +204,7 @@
           <a:p>
             <a:fld id="{254DE903-8928-4F53-8948-4BEA2CACA4FB}" type="datetimeFigureOut">
               <a:rPr lang="en-US" smtClean="0"/>
-              <a:t>12/3/2025</a:t>
+              <a:t>12/4/2025</a:t>
             </a:fld>
             <a:endParaRPr lang="en-US"/>
           </a:p>
@@ -622,6 +622,90 @@
           <a:bodyPr/>
           <a:lstStyle/>
           <a:p>
+            <a:endParaRPr lang="en-US" dirty="0"/>
+          </a:p>
+        </p:txBody>
+      </p:sp>
+      <p:sp>
+        <p:nvSpPr>
+          <p:cNvPr id="4" name="Slide Number Placeholder 3"/>
+          <p:cNvSpPr>
+            <a:spLocks noGrp="1"/>
+          </p:cNvSpPr>
+          <p:nvPr>
+            <p:ph type="sldNum" sz="quarter" idx="5"/>
+          </p:nvPr>
+        </p:nvSpPr>
+        <p:spPr/>
+        <p:txBody>
+          <a:bodyPr/>
+          <a:lstStyle/>
+          <a:p>
+            <a:fld id="{8CD58DCE-95A7-4CB9-A6D8-A46A167DF4A3}" type="slidenum">
+              <a:rPr lang="en-US" smtClean="0"/>
+              <a:t>3</a:t>
+            </a:fld>
+            <a:endParaRPr lang="en-US"/>
+          </a:p>
+        </p:txBody>
+      </p:sp>
+    </p:spTree>
+    <p:extLst>
+      <p:ext uri="{BB962C8B-B14F-4D97-AF65-F5344CB8AC3E}">
+        <p14:creationId xmlns:p14="http://schemas.microsoft.com/office/powerpoint/2010/main" val="597292638"/>
+      </p:ext>
+    </p:extLst>
+  </p:cSld>
+  <p:clrMapOvr>
+    <a:masterClrMapping/>
+  </p:clrMapOvr>
+</p:notes>
+</file>
+
+<file path=ppt/notesSlides/notesSlide3.xml><?xml version="1.0" encoding="utf-8"?>
+<p:notes xmlns:a="http://schemas.openxmlformats.org/drawingml/2006/main" xmlns:r="http://schemas.openxmlformats.org/officeDocument/2006/relationships" xmlns:p="http://schemas.openxmlformats.org/presentationml/2006/main">
+  <p:cSld>
+    <p:spTree>
+      <p:nvGrpSpPr>
+        <p:cNvPr id="1" name=""/>
+        <p:cNvGrpSpPr/>
+        <p:nvPr/>
+      </p:nvGrpSpPr>
+      <p:grpSpPr>
+        <a:xfrm>
+          <a:off x="0" y="0"/>
+          <a:ext cx="0" cy="0"/>
+          <a:chOff x="0" y="0"/>
+          <a:chExt cx="0" cy="0"/>
+        </a:xfrm>
+      </p:grpSpPr>
+      <p:sp>
+        <p:nvSpPr>
+          <p:cNvPr id="2" name="Slide Image Placeholder 1"/>
+          <p:cNvSpPr>
+            <a:spLocks noGrp="1" noRot="1" noChangeAspect="1"/>
+          </p:cNvSpPr>
+          <p:nvPr>
+            <p:ph type="sldImg"/>
+          </p:nvPr>
+        </p:nvSpPr>
+        <p:spPr/>
+      </p:sp>
+      <p:sp>
+        <p:nvSpPr>
+          <p:cNvPr id="3" name="Notes Placeholder 2"/>
+          <p:cNvSpPr>
+            <a:spLocks noGrp="1"/>
+          </p:cNvSpPr>
+          <p:nvPr>
+            <p:ph type="body" idx="1"/>
+          </p:nvPr>
+        </p:nvSpPr>
+        <p:spPr/>
+        <p:txBody>
+          <a:bodyPr/>
+          <a:lstStyle/>
+          <a:p>
             <a:r>
               <a:rPr lang="en-US" dirty="0"/>
               <a:t>MNIST is simpler and has been used much more than Flowers102. </a:t>
@@ -687,7 +771,7 @@
           <p:cNvPr id="2" name="Title 1">
             <a:extLst>
               <a:ext uri="{FF2B5EF4-FFF2-40B4-BE49-F238E27FC236}">
-                <a16:creationId xmlns:a16="http://schemas.microsoft.com/office/drawing/2014/main" id="{93899BDC-FB06-9C74-3E6E-7580E3D877B6}"/>
+                <a16:creationId xmlns:a16="http://schemas.microsoft.com/office/drawing/2014/main" id="{7695C5ED-DEEF-F2C7-B01A-D7F228472EAF}"/>
               </a:ext>
             </a:extLst>
           </p:cNvPr>
@@ -724,7 +808,7 @@
           <p:cNvPr id="3" name="Subtitle 2">
             <a:extLst>
               <a:ext uri="{FF2B5EF4-FFF2-40B4-BE49-F238E27FC236}">
-                <a16:creationId xmlns:a16="http://schemas.microsoft.com/office/drawing/2014/main" id="{C9A0B7F3-C7C8-153A-721D-A51AE3079E31}"/>
+                <a16:creationId xmlns:a16="http://schemas.microsoft.com/office/drawing/2014/main" id="{20AB1415-C7CA-14FB-56EC-B2CE468A174E}"/>
               </a:ext>
             </a:extLst>
           </p:cNvPr>
@@ -794,7 +878,7 @@
           <p:cNvPr id="4" name="Date Placeholder 3">
             <a:extLst>
               <a:ext uri="{FF2B5EF4-FFF2-40B4-BE49-F238E27FC236}">
-                <a16:creationId xmlns:a16="http://schemas.microsoft.com/office/drawing/2014/main" id="{D7A54156-5997-96B6-BC30-11AFB45EB092}"/>
+                <a16:creationId xmlns:a16="http://schemas.microsoft.com/office/drawing/2014/main" id="{B14CF1C4-6C13-BCE1-322B-355AD3DE6682}"/>
               </a:ext>
             </a:extLst>
           </p:cNvPr>
@@ -812,7 +896,7 @@
           <a:p>
             <a:fld id="{A53D0CF4-1CA0-4C2A-8220-83BA371E72A4}" type="datetimeFigureOut">
               <a:rPr lang="en-US" smtClean="0"/>
-              <a:t>12/3/2025</a:t>
+              <a:t>12/4/2025</a:t>
             </a:fld>
             <a:endParaRPr lang="en-US"/>
           </a:p>
@@ -823,7 +907,7 @@
           <p:cNvPr id="5" name="Footer Placeholder 4">
             <a:extLst>
               <a:ext uri="{FF2B5EF4-FFF2-40B4-BE49-F238E27FC236}">
-                <a16:creationId xmlns:a16="http://schemas.microsoft.com/office/drawing/2014/main" id="{96ED3531-A079-D8CF-3576-EB980F701B93}"/>
+                <a16:creationId xmlns:a16="http://schemas.microsoft.com/office/drawing/2014/main" id="{946C9932-ABAA-DB33-C483-B4E8C7CFE216}"/>
               </a:ext>
             </a:extLst>
           </p:cNvPr>
@@ -848,7 +932,7 @@
           <p:cNvPr id="6" name="Slide Number Placeholder 5">
             <a:extLst>
               <a:ext uri="{FF2B5EF4-FFF2-40B4-BE49-F238E27FC236}">
-                <a16:creationId xmlns:a16="http://schemas.microsoft.com/office/drawing/2014/main" id="{902DED14-F597-FE1A-2B91-F82BDFBC8131}"/>
+                <a16:creationId xmlns:a16="http://schemas.microsoft.com/office/drawing/2014/main" id="{0CFA72C6-AF51-6808-A657-D3F7AA33944B}"/>
               </a:ext>
             </a:extLst>
           </p:cNvPr>
@@ -875,7 +959,7 @@
     </p:spTree>
     <p:extLst>
       <p:ext uri="{BB962C8B-B14F-4D97-AF65-F5344CB8AC3E}">
-        <p14:creationId xmlns:p14="http://schemas.microsoft.com/office/powerpoint/2010/main" val="2898350582"/>
+        <p14:creationId xmlns:p14="http://schemas.microsoft.com/office/powerpoint/2010/main" val="3880507047"/>
       </p:ext>
     </p:extLst>
   </p:cSld>
@@ -907,7 +991,7 @@
           <p:cNvPr id="2" name="Title 1">
             <a:extLst>
               <a:ext uri="{FF2B5EF4-FFF2-40B4-BE49-F238E27FC236}">
-                <a16:creationId xmlns:a16="http://schemas.microsoft.com/office/drawing/2014/main" id="{7EDACE5E-8389-0575-3C72-BE378AFB1F82}"/>
+                <a16:creationId xmlns:a16="http://schemas.microsoft.com/office/drawing/2014/main" id="{A3B2DA70-9818-1AAD-5F4B-E558DD0F143A}"/>
               </a:ext>
             </a:extLst>
           </p:cNvPr>
@@ -935,7 +1019,7 @@
           <p:cNvPr id="3" name="Vertical Text Placeholder 2">
             <a:extLst>
               <a:ext uri="{FF2B5EF4-FFF2-40B4-BE49-F238E27FC236}">
-                <a16:creationId xmlns:a16="http://schemas.microsoft.com/office/drawing/2014/main" id="{6759AF71-B61B-21F4-E452-3F08F4013D14}"/>
+                <a16:creationId xmlns:a16="http://schemas.microsoft.com/office/drawing/2014/main" id="{597C1A53-5CAB-4423-1D9D-56999A67584F}"/>
               </a:ext>
             </a:extLst>
           </p:cNvPr>
@@ -992,7 +1076,7 @@
           <p:cNvPr id="4" name="Date Placeholder 3">
             <a:extLst>
               <a:ext uri="{FF2B5EF4-FFF2-40B4-BE49-F238E27FC236}">
-                <a16:creationId xmlns:a16="http://schemas.microsoft.com/office/drawing/2014/main" id="{72CE30AB-9991-4650-DAD4-2A7F184BD631}"/>
+                <a16:creationId xmlns:a16="http://schemas.microsoft.com/office/drawing/2014/main" id="{C2B3C902-33D3-6707-E32E-A2835FD6011A}"/>
               </a:ext>
             </a:extLst>
           </p:cNvPr>
@@ -1010,7 +1094,7 @@
           <a:p>
             <a:fld id="{A53D0CF4-1CA0-4C2A-8220-83BA371E72A4}" type="datetimeFigureOut">
               <a:rPr lang="en-US" smtClean="0"/>
-              <a:t>12/3/2025</a:t>
+              <a:t>12/4/2025</a:t>
             </a:fld>
             <a:endParaRPr lang="en-US"/>
           </a:p>
@@ -1021,7 +1105,7 @@
           <p:cNvPr id="5" name="Footer Placeholder 4">
             <a:extLst>
               <a:ext uri="{FF2B5EF4-FFF2-40B4-BE49-F238E27FC236}">
-                <a16:creationId xmlns:a16="http://schemas.microsoft.com/office/drawing/2014/main" id="{7CC2023B-F264-51A1-71C6-6088A1B1A1DC}"/>
+                <a16:creationId xmlns:a16="http://schemas.microsoft.com/office/drawing/2014/main" id="{06524CAF-F9D4-43A8-CC62-2175B9953C58}"/>
               </a:ext>
             </a:extLst>
           </p:cNvPr>
@@ -1046,7 +1130,7 @@
           <p:cNvPr id="6" name="Slide Number Placeholder 5">
             <a:extLst>
               <a:ext uri="{FF2B5EF4-FFF2-40B4-BE49-F238E27FC236}">
-                <a16:creationId xmlns:a16="http://schemas.microsoft.com/office/drawing/2014/main" id="{A75DA011-5DBC-1EFE-B4FE-BC568530537E}"/>
+                <a16:creationId xmlns:a16="http://schemas.microsoft.com/office/drawing/2014/main" id="{0DCBC374-5B86-CC61-1B0C-567FE05885EA}"/>
               </a:ext>
             </a:extLst>
           </p:cNvPr>
@@ -1073,7 +1157,7 @@
     </p:spTree>
     <p:extLst>
       <p:ext uri="{BB962C8B-B14F-4D97-AF65-F5344CB8AC3E}">
-        <p14:creationId xmlns:p14="http://schemas.microsoft.com/office/powerpoint/2010/main" val="986064180"/>
+        <p14:creationId xmlns:p14="http://schemas.microsoft.com/office/powerpoint/2010/main" val="316370791"/>
       </p:ext>
     </p:extLst>
   </p:cSld>
@@ -1105,7 +1189,7 @@
           <p:cNvPr id="2" name="Vertical Title 1">
             <a:extLst>
               <a:ext uri="{FF2B5EF4-FFF2-40B4-BE49-F238E27FC236}">
-                <a16:creationId xmlns:a16="http://schemas.microsoft.com/office/drawing/2014/main" id="{23BECA7B-4F0B-21B5-A472-7A8B3134C83F}"/>
+                <a16:creationId xmlns:a16="http://schemas.microsoft.com/office/drawing/2014/main" id="{5F5D4C86-52BB-43F7-A920-227B2E5E9E4D}"/>
               </a:ext>
             </a:extLst>
           </p:cNvPr>
@@ -1138,7 +1222,7 @@
           <p:cNvPr id="3" name="Vertical Text Placeholder 2">
             <a:extLst>
               <a:ext uri="{FF2B5EF4-FFF2-40B4-BE49-F238E27FC236}">
-                <a16:creationId xmlns:a16="http://schemas.microsoft.com/office/drawing/2014/main" id="{9B325FEB-3292-659F-4DA1-59C74902FAED}"/>
+                <a16:creationId xmlns:a16="http://schemas.microsoft.com/office/drawing/2014/main" id="{2078DBC9-E629-0B84-3FE8-3FCCD69ACAC7}"/>
               </a:ext>
             </a:extLst>
           </p:cNvPr>
@@ -1200,7 +1284,7 @@
           <p:cNvPr id="4" name="Date Placeholder 3">
             <a:extLst>
               <a:ext uri="{FF2B5EF4-FFF2-40B4-BE49-F238E27FC236}">
-                <a16:creationId xmlns:a16="http://schemas.microsoft.com/office/drawing/2014/main" id="{0BBAA15D-D40C-C79C-3CD7-9EDDA0A3F0A8}"/>
+                <a16:creationId xmlns:a16="http://schemas.microsoft.com/office/drawing/2014/main" id="{EBB9C791-6F25-2078-8F17-8C0298614731}"/>
               </a:ext>
             </a:extLst>
           </p:cNvPr>
@@ -1218,7 +1302,7 @@
           <a:p>
             <a:fld id="{A53D0CF4-1CA0-4C2A-8220-83BA371E72A4}" type="datetimeFigureOut">
               <a:rPr lang="en-US" smtClean="0"/>
-              <a:t>12/3/2025</a:t>
+              <a:t>12/4/2025</a:t>
             </a:fld>
             <a:endParaRPr lang="en-US"/>
           </a:p>
@@ -1229,7 +1313,7 @@
           <p:cNvPr id="5" name="Footer Placeholder 4">
             <a:extLst>
               <a:ext uri="{FF2B5EF4-FFF2-40B4-BE49-F238E27FC236}">
-                <a16:creationId xmlns:a16="http://schemas.microsoft.com/office/drawing/2014/main" id="{18468B10-0CC0-0EBC-2107-A2741A771809}"/>
+                <a16:creationId xmlns:a16="http://schemas.microsoft.com/office/drawing/2014/main" id="{39EEB4B0-1D5A-4510-162B-B17A36D979BE}"/>
               </a:ext>
             </a:extLst>
           </p:cNvPr>
@@ -1254,7 +1338,7 @@
           <p:cNvPr id="6" name="Slide Number Placeholder 5">
             <a:extLst>
               <a:ext uri="{FF2B5EF4-FFF2-40B4-BE49-F238E27FC236}">
-                <a16:creationId xmlns:a16="http://schemas.microsoft.com/office/drawing/2014/main" id="{5600A9E3-D38C-0267-86C3-01B2BE9F60D7}"/>
+                <a16:creationId xmlns:a16="http://schemas.microsoft.com/office/drawing/2014/main" id="{232E5FE0-4B67-8788-9EDF-1AD48C517B29}"/>
               </a:ext>
             </a:extLst>
           </p:cNvPr>
@@ -1281,7 +1365,7 @@
     </p:spTree>
     <p:extLst>
       <p:ext uri="{BB962C8B-B14F-4D97-AF65-F5344CB8AC3E}">
-        <p14:creationId xmlns:p14="http://schemas.microsoft.com/office/powerpoint/2010/main" val="1846707343"/>
+        <p14:creationId xmlns:p14="http://schemas.microsoft.com/office/powerpoint/2010/main" val="1307444444"/>
       </p:ext>
     </p:extLst>
   </p:cSld>
@@ -1313,7 +1397,7 @@
           <p:cNvPr id="2" name="Title 1">
             <a:extLst>
               <a:ext uri="{FF2B5EF4-FFF2-40B4-BE49-F238E27FC236}">
-                <a16:creationId xmlns:a16="http://schemas.microsoft.com/office/drawing/2014/main" id="{11001B44-60FA-A3F1-422E-27DAB9ABCDFB}"/>
+                <a16:creationId xmlns:a16="http://schemas.microsoft.com/office/drawing/2014/main" id="{D5174CE0-9447-6AD0-2C60-4E67FC73C52E}"/>
               </a:ext>
             </a:extLst>
           </p:cNvPr>
@@ -1341,7 +1425,7 @@
           <p:cNvPr id="3" name="Content Placeholder 2">
             <a:extLst>
               <a:ext uri="{FF2B5EF4-FFF2-40B4-BE49-F238E27FC236}">
-                <a16:creationId xmlns:a16="http://schemas.microsoft.com/office/drawing/2014/main" id="{EE4B0148-8D37-FBCD-11ED-4947EA30A547}"/>
+                <a16:creationId xmlns:a16="http://schemas.microsoft.com/office/drawing/2014/main" id="{8A723AB9-97AD-A5F2-D156-282794D76E02}"/>
               </a:ext>
             </a:extLst>
           </p:cNvPr>
@@ -1398,7 +1482,7 @@
           <p:cNvPr id="4" name="Date Placeholder 3">
             <a:extLst>
               <a:ext uri="{FF2B5EF4-FFF2-40B4-BE49-F238E27FC236}">
-                <a16:creationId xmlns:a16="http://schemas.microsoft.com/office/drawing/2014/main" id="{80459EE7-6784-3109-AA45-56A7826552FA}"/>
+                <a16:creationId xmlns:a16="http://schemas.microsoft.com/office/drawing/2014/main" id="{030831BF-CC03-3BAA-8867-F63B3B84F415}"/>
               </a:ext>
             </a:extLst>
           </p:cNvPr>
@@ -1416,7 +1500,7 @@
           <a:p>
             <a:fld id="{A53D0CF4-1CA0-4C2A-8220-83BA371E72A4}" type="datetimeFigureOut">
               <a:rPr lang="en-US" smtClean="0"/>
-              <a:t>12/3/2025</a:t>
+              <a:t>12/4/2025</a:t>
             </a:fld>
             <a:endParaRPr lang="en-US"/>
           </a:p>
@@ -1427,7 +1511,7 @@
           <p:cNvPr id="5" name="Footer Placeholder 4">
             <a:extLst>
               <a:ext uri="{FF2B5EF4-FFF2-40B4-BE49-F238E27FC236}">
-                <a16:creationId xmlns:a16="http://schemas.microsoft.com/office/drawing/2014/main" id="{43D13203-845D-68A2-29B8-8F066A06FECD}"/>
+                <a16:creationId xmlns:a16="http://schemas.microsoft.com/office/drawing/2014/main" id="{453669D7-1800-DFE0-5553-7EB2047730C7}"/>
               </a:ext>
             </a:extLst>
           </p:cNvPr>
@@ -1452,7 +1536,7 @@
           <p:cNvPr id="6" name="Slide Number Placeholder 5">
             <a:extLst>
               <a:ext uri="{FF2B5EF4-FFF2-40B4-BE49-F238E27FC236}">
-                <a16:creationId xmlns:a16="http://schemas.microsoft.com/office/drawing/2014/main" id="{BB9AC20F-DBD8-A8E8-7100-2D42C9991AA6}"/>
+                <a16:creationId xmlns:a16="http://schemas.microsoft.com/office/drawing/2014/main" id="{F275CF9F-305A-45E0-E481-93D00C2EC27F}"/>
               </a:ext>
             </a:extLst>
           </p:cNvPr>
@@ -1479,7 +1563,7 @@
     </p:spTree>
     <p:extLst>
       <p:ext uri="{BB962C8B-B14F-4D97-AF65-F5344CB8AC3E}">
-        <p14:creationId xmlns:p14="http://schemas.microsoft.com/office/powerpoint/2010/main" val="3031170252"/>
+        <p14:creationId xmlns:p14="http://schemas.microsoft.com/office/powerpoint/2010/main" val="1058398991"/>
       </p:ext>
     </p:extLst>
   </p:cSld>
@@ -1511,7 +1595,7 @@
           <p:cNvPr id="2" name="Title 1">
             <a:extLst>
               <a:ext uri="{FF2B5EF4-FFF2-40B4-BE49-F238E27FC236}">
-                <a16:creationId xmlns:a16="http://schemas.microsoft.com/office/drawing/2014/main" id="{A0DE7F41-7DA6-AF19-8E5C-E2DC31E85A64}"/>
+                <a16:creationId xmlns:a16="http://schemas.microsoft.com/office/drawing/2014/main" id="{A21C9345-42CA-D93E-60D6-04EBDA34A3F7}"/>
               </a:ext>
             </a:extLst>
           </p:cNvPr>
@@ -1548,7 +1632,7 @@
           <p:cNvPr id="3" name="Text Placeholder 2">
             <a:extLst>
               <a:ext uri="{FF2B5EF4-FFF2-40B4-BE49-F238E27FC236}">
-                <a16:creationId xmlns:a16="http://schemas.microsoft.com/office/drawing/2014/main" id="{3F302A06-812E-7CFD-FE85-F5B9DA99CA9C}"/>
+                <a16:creationId xmlns:a16="http://schemas.microsoft.com/office/drawing/2014/main" id="{912BB3B7-A657-DC05-0FFA-3B0AE82C28DD}"/>
               </a:ext>
             </a:extLst>
           </p:cNvPr>
@@ -1673,7 +1757,7 @@
           <p:cNvPr id="4" name="Date Placeholder 3">
             <a:extLst>
               <a:ext uri="{FF2B5EF4-FFF2-40B4-BE49-F238E27FC236}">
-                <a16:creationId xmlns:a16="http://schemas.microsoft.com/office/drawing/2014/main" id="{159BE6C7-68F8-F575-722E-7DBCD23DDA9B}"/>
+                <a16:creationId xmlns:a16="http://schemas.microsoft.com/office/drawing/2014/main" id="{8610B533-A4FF-1F93-B311-4CC59FC0B750}"/>
               </a:ext>
             </a:extLst>
           </p:cNvPr>
@@ -1691,7 +1775,7 @@
           <a:p>
             <a:fld id="{A53D0CF4-1CA0-4C2A-8220-83BA371E72A4}" type="datetimeFigureOut">
               <a:rPr lang="en-US" smtClean="0"/>
-              <a:t>12/3/2025</a:t>
+              <a:t>12/4/2025</a:t>
             </a:fld>
             <a:endParaRPr lang="en-US"/>
           </a:p>
@@ -1702,7 +1786,7 @@
           <p:cNvPr id="5" name="Footer Placeholder 4">
             <a:extLst>
               <a:ext uri="{FF2B5EF4-FFF2-40B4-BE49-F238E27FC236}">
-                <a16:creationId xmlns:a16="http://schemas.microsoft.com/office/drawing/2014/main" id="{FAFB66F2-E9F1-8462-CF00-A6F0419EDC26}"/>
+                <a16:creationId xmlns:a16="http://schemas.microsoft.com/office/drawing/2014/main" id="{2EA9D813-CBC1-E1E8-141B-6D868A829B97}"/>
               </a:ext>
             </a:extLst>
           </p:cNvPr>
@@ -1727,7 +1811,7 @@
           <p:cNvPr id="6" name="Slide Number Placeholder 5">
             <a:extLst>
               <a:ext uri="{FF2B5EF4-FFF2-40B4-BE49-F238E27FC236}">
-                <a16:creationId xmlns:a16="http://schemas.microsoft.com/office/drawing/2014/main" id="{E6AEC434-E786-94FA-1002-69DD8D95CE04}"/>
+                <a16:creationId xmlns:a16="http://schemas.microsoft.com/office/drawing/2014/main" id="{A5366B01-C48C-7687-8D76-B39B2DFFE988}"/>
               </a:ext>
             </a:extLst>
           </p:cNvPr>
@@ -1754,7 +1838,7 @@
     </p:spTree>
     <p:extLst>
       <p:ext uri="{BB962C8B-B14F-4D97-AF65-F5344CB8AC3E}">
-        <p14:creationId xmlns:p14="http://schemas.microsoft.com/office/powerpoint/2010/main" val="2251989026"/>
+        <p14:creationId xmlns:p14="http://schemas.microsoft.com/office/powerpoint/2010/main" val="2492797504"/>
       </p:ext>
     </p:extLst>
   </p:cSld>
@@ -1786,7 +1870,7 @@
           <p:cNvPr id="2" name="Title 1">
             <a:extLst>
               <a:ext uri="{FF2B5EF4-FFF2-40B4-BE49-F238E27FC236}">
-                <a16:creationId xmlns:a16="http://schemas.microsoft.com/office/drawing/2014/main" id="{C2B4C809-8B7E-DA0E-0F7D-F3D53B403035}"/>
+                <a16:creationId xmlns:a16="http://schemas.microsoft.com/office/drawing/2014/main" id="{E1F3AF62-3FBC-0515-C054-76463828D97B}"/>
               </a:ext>
             </a:extLst>
           </p:cNvPr>
@@ -1814,7 +1898,7 @@
           <p:cNvPr id="3" name="Content Placeholder 2">
             <a:extLst>
               <a:ext uri="{FF2B5EF4-FFF2-40B4-BE49-F238E27FC236}">
-                <a16:creationId xmlns:a16="http://schemas.microsoft.com/office/drawing/2014/main" id="{DC8CDB3B-A936-07F5-BD2B-95FCDF3692FD}"/>
+                <a16:creationId xmlns:a16="http://schemas.microsoft.com/office/drawing/2014/main" id="{2977F421-5091-FC99-869A-CE8E66479BF6}"/>
               </a:ext>
             </a:extLst>
           </p:cNvPr>
@@ -1876,7 +1960,7 @@
           <p:cNvPr id="4" name="Content Placeholder 3">
             <a:extLst>
               <a:ext uri="{FF2B5EF4-FFF2-40B4-BE49-F238E27FC236}">
-                <a16:creationId xmlns:a16="http://schemas.microsoft.com/office/drawing/2014/main" id="{F2B19ADC-55BE-507C-9DAE-A3BAEBF40D50}"/>
+                <a16:creationId xmlns:a16="http://schemas.microsoft.com/office/drawing/2014/main" id="{ABC532D0-E1A4-9496-76A1-C01B0167E304}"/>
               </a:ext>
             </a:extLst>
           </p:cNvPr>
@@ -1938,7 +2022,7 @@
           <p:cNvPr id="5" name="Date Placeholder 4">
             <a:extLst>
               <a:ext uri="{FF2B5EF4-FFF2-40B4-BE49-F238E27FC236}">
-                <a16:creationId xmlns:a16="http://schemas.microsoft.com/office/drawing/2014/main" id="{D28062A0-74DC-2907-605A-5B20CDE9F3E5}"/>
+                <a16:creationId xmlns:a16="http://schemas.microsoft.com/office/drawing/2014/main" id="{8627B683-5E59-F29E-2FAC-68CB9DEC1025}"/>
               </a:ext>
             </a:extLst>
           </p:cNvPr>
@@ -1956,7 +2040,7 @@
           <a:p>
             <a:fld id="{A53D0CF4-1CA0-4C2A-8220-83BA371E72A4}" type="datetimeFigureOut">
               <a:rPr lang="en-US" smtClean="0"/>
-              <a:t>12/3/2025</a:t>
+              <a:t>12/4/2025</a:t>
             </a:fld>
             <a:endParaRPr lang="en-US"/>
           </a:p>
@@ -1967,7 +2051,7 @@
           <p:cNvPr id="6" name="Footer Placeholder 5">
             <a:extLst>
               <a:ext uri="{FF2B5EF4-FFF2-40B4-BE49-F238E27FC236}">
-                <a16:creationId xmlns:a16="http://schemas.microsoft.com/office/drawing/2014/main" id="{BB752D7C-B29B-4132-4FCA-19F1BC26F8C9}"/>
+                <a16:creationId xmlns:a16="http://schemas.microsoft.com/office/drawing/2014/main" id="{88C7B25C-FC01-547F-68A7-E1F9119DACEE}"/>
               </a:ext>
             </a:extLst>
           </p:cNvPr>
@@ -1992,7 +2076,7 @@
           <p:cNvPr id="7" name="Slide Number Placeholder 6">
             <a:extLst>
               <a:ext uri="{FF2B5EF4-FFF2-40B4-BE49-F238E27FC236}">
-                <a16:creationId xmlns:a16="http://schemas.microsoft.com/office/drawing/2014/main" id="{91EF1968-BF37-92B1-2D3F-B7D0D25AA1EB}"/>
+                <a16:creationId xmlns:a16="http://schemas.microsoft.com/office/drawing/2014/main" id="{4DB39161-2275-45F2-640D-3ED71BEF23F4}"/>
               </a:ext>
             </a:extLst>
           </p:cNvPr>
@@ -2019,7 +2103,7 @@
     </p:spTree>
     <p:extLst>
       <p:ext uri="{BB962C8B-B14F-4D97-AF65-F5344CB8AC3E}">
-        <p14:creationId xmlns:p14="http://schemas.microsoft.com/office/powerpoint/2010/main" val="376420022"/>
+        <p14:creationId xmlns:p14="http://schemas.microsoft.com/office/powerpoint/2010/main" val="3200824450"/>
       </p:ext>
     </p:extLst>
   </p:cSld>
@@ -2051,7 +2135,7 @@
           <p:cNvPr id="2" name="Title 1">
             <a:extLst>
               <a:ext uri="{FF2B5EF4-FFF2-40B4-BE49-F238E27FC236}">
-                <a16:creationId xmlns:a16="http://schemas.microsoft.com/office/drawing/2014/main" id="{BADAECD5-7EB5-3B31-2076-7345A7B1FB8B}"/>
+                <a16:creationId xmlns:a16="http://schemas.microsoft.com/office/drawing/2014/main" id="{9E709D74-A252-DB35-9B9F-E62649FDEC16}"/>
               </a:ext>
             </a:extLst>
           </p:cNvPr>
@@ -2084,7 +2168,7 @@
           <p:cNvPr id="3" name="Text Placeholder 2">
             <a:extLst>
               <a:ext uri="{FF2B5EF4-FFF2-40B4-BE49-F238E27FC236}">
-                <a16:creationId xmlns:a16="http://schemas.microsoft.com/office/drawing/2014/main" id="{9B308D66-B8E2-A3B9-142A-1D63DB19CFBD}"/>
+                <a16:creationId xmlns:a16="http://schemas.microsoft.com/office/drawing/2014/main" id="{292A7BE4-5E07-091F-5A04-8D15747023DF}"/>
               </a:ext>
             </a:extLst>
           </p:cNvPr>
@@ -2155,7 +2239,7 @@
           <p:cNvPr id="4" name="Content Placeholder 3">
             <a:extLst>
               <a:ext uri="{FF2B5EF4-FFF2-40B4-BE49-F238E27FC236}">
-                <a16:creationId xmlns:a16="http://schemas.microsoft.com/office/drawing/2014/main" id="{72FD7A4B-A66C-6ABE-0E50-9BF0C4CA8B4F}"/>
+                <a16:creationId xmlns:a16="http://schemas.microsoft.com/office/drawing/2014/main" id="{31752A74-C8C0-78ED-F27B-3269292F2750}"/>
               </a:ext>
             </a:extLst>
           </p:cNvPr>
@@ -2217,7 +2301,7 @@
           <p:cNvPr id="5" name="Text Placeholder 4">
             <a:extLst>
               <a:ext uri="{FF2B5EF4-FFF2-40B4-BE49-F238E27FC236}">
-                <a16:creationId xmlns:a16="http://schemas.microsoft.com/office/drawing/2014/main" id="{38005F75-8EDE-EDD0-0092-47F64B0790ED}"/>
+                <a16:creationId xmlns:a16="http://schemas.microsoft.com/office/drawing/2014/main" id="{02728700-6BE3-18AA-E056-ECF8ED00AF33}"/>
               </a:ext>
             </a:extLst>
           </p:cNvPr>
@@ -2288,7 +2372,7 @@
           <p:cNvPr id="6" name="Content Placeholder 5">
             <a:extLst>
               <a:ext uri="{FF2B5EF4-FFF2-40B4-BE49-F238E27FC236}">
-                <a16:creationId xmlns:a16="http://schemas.microsoft.com/office/drawing/2014/main" id="{510A3B5B-9C4A-138E-058C-19DD2EF6BEC6}"/>
+                <a16:creationId xmlns:a16="http://schemas.microsoft.com/office/drawing/2014/main" id="{50FEF3EF-CA9A-2C1D-0D96-BCC7C7F70140}"/>
               </a:ext>
             </a:extLst>
           </p:cNvPr>
@@ -2350,7 +2434,7 @@
           <p:cNvPr id="7" name="Date Placeholder 6">
             <a:extLst>
               <a:ext uri="{FF2B5EF4-FFF2-40B4-BE49-F238E27FC236}">
-                <a16:creationId xmlns:a16="http://schemas.microsoft.com/office/drawing/2014/main" id="{97485679-4462-3D59-A18A-56893E11250A}"/>
+                <a16:creationId xmlns:a16="http://schemas.microsoft.com/office/drawing/2014/main" id="{D51A1560-3D16-5966-4FB1-6FA058F3A643}"/>
               </a:ext>
             </a:extLst>
           </p:cNvPr>
@@ -2368,7 +2452,7 @@
           <a:p>
             <a:fld id="{A53D0CF4-1CA0-4C2A-8220-83BA371E72A4}" type="datetimeFigureOut">
               <a:rPr lang="en-US" smtClean="0"/>
-              <a:t>12/3/2025</a:t>
+              <a:t>12/4/2025</a:t>
             </a:fld>
             <a:endParaRPr lang="en-US"/>
           </a:p>
@@ -2379,7 +2463,7 @@
           <p:cNvPr id="8" name="Footer Placeholder 7">
             <a:extLst>
               <a:ext uri="{FF2B5EF4-FFF2-40B4-BE49-F238E27FC236}">
-                <a16:creationId xmlns:a16="http://schemas.microsoft.com/office/drawing/2014/main" id="{2AD81132-AD5C-2D29-0F9C-E52A5BED2F8C}"/>
+                <a16:creationId xmlns:a16="http://schemas.microsoft.com/office/drawing/2014/main" id="{AF809922-0945-C1D0-0B88-EA53B849FE36}"/>
               </a:ext>
             </a:extLst>
           </p:cNvPr>
@@ -2404,7 +2488,7 @@
           <p:cNvPr id="9" name="Slide Number Placeholder 8">
             <a:extLst>
               <a:ext uri="{FF2B5EF4-FFF2-40B4-BE49-F238E27FC236}">
-                <a16:creationId xmlns:a16="http://schemas.microsoft.com/office/drawing/2014/main" id="{CA787062-75B5-A16C-E34B-851E906D9D26}"/>
+                <a16:creationId xmlns:a16="http://schemas.microsoft.com/office/drawing/2014/main" id="{A3ECFE66-6D6E-3462-DA3B-E20A407BD8B2}"/>
               </a:ext>
             </a:extLst>
           </p:cNvPr>
@@ -2431,7 +2515,7 @@
     </p:spTree>
     <p:extLst>
       <p:ext uri="{BB962C8B-B14F-4D97-AF65-F5344CB8AC3E}">
-        <p14:creationId xmlns:p14="http://schemas.microsoft.com/office/powerpoint/2010/main" val="1556455506"/>
+        <p14:creationId xmlns:p14="http://schemas.microsoft.com/office/powerpoint/2010/main" val="4261239516"/>
       </p:ext>
     </p:extLst>
   </p:cSld>
@@ -2463,7 +2547,7 @@
           <p:cNvPr id="2" name="Title 1">
             <a:extLst>
               <a:ext uri="{FF2B5EF4-FFF2-40B4-BE49-F238E27FC236}">
-                <a16:creationId xmlns:a16="http://schemas.microsoft.com/office/drawing/2014/main" id="{6F1B555A-F91D-C15A-0818-A75F7742F6C8}"/>
+                <a16:creationId xmlns:a16="http://schemas.microsoft.com/office/drawing/2014/main" id="{E944C34E-BA15-8497-7537-00C0D6FEB975}"/>
               </a:ext>
             </a:extLst>
           </p:cNvPr>
@@ -2491,7 +2575,7 @@
           <p:cNvPr id="3" name="Date Placeholder 2">
             <a:extLst>
               <a:ext uri="{FF2B5EF4-FFF2-40B4-BE49-F238E27FC236}">
-                <a16:creationId xmlns:a16="http://schemas.microsoft.com/office/drawing/2014/main" id="{95E7EA42-20E5-CB4D-2A16-A6A9C1B0692D}"/>
+                <a16:creationId xmlns:a16="http://schemas.microsoft.com/office/drawing/2014/main" id="{C7E8AED4-99C0-5049-D2DE-B0A450360092}"/>
               </a:ext>
             </a:extLst>
           </p:cNvPr>
@@ -2509,7 +2593,7 @@
           <a:p>
             <a:fld id="{A53D0CF4-1CA0-4C2A-8220-83BA371E72A4}" type="datetimeFigureOut">
               <a:rPr lang="en-US" smtClean="0"/>
-              <a:t>12/3/2025</a:t>
+              <a:t>12/4/2025</a:t>
             </a:fld>
             <a:endParaRPr lang="en-US"/>
           </a:p>
@@ -2520,7 +2604,7 @@
           <p:cNvPr id="4" name="Footer Placeholder 3">
             <a:extLst>
               <a:ext uri="{FF2B5EF4-FFF2-40B4-BE49-F238E27FC236}">
-                <a16:creationId xmlns:a16="http://schemas.microsoft.com/office/drawing/2014/main" id="{3061D85D-2CAE-A63A-9F84-BEE2B25AC449}"/>
+                <a16:creationId xmlns:a16="http://schemas.microsoft.com/office/drawing/2014/main" id="{B91A673A-5329-6D2A-4167-E76384463A2E}"/>
               </a:ext>
             </a:extLst>
           </p:cNvPr>
@@ -2545,7 +2629,7 @@
           <p:cNvPr id="5" name="Slide Number Placeholder 4">
             <a:extLst>
               <a:ext uri="{FF2B5EF4-FFF2-40B4-BE49-F238E27FC236}">
-                <a16:creationId xmlns:a16="http://schemas.microsoft.com/office/drawing/2014/main" id="{154A54C9-E0C3-662B-5816-58F2A65759E6}"/>
+                <a16:creationId xmlns:a16="http://schemas.microsoft.com/office/drawing/2014/main" id="{0B28EAF8-11EF-F996-2181-6F55B3647FB9}"/>
               </a:ext>
             </a:extLst>
           </p:cNvPr>
@@ -2572,7 +2656,7 @@
     </p:spTree>
     <p:extLst>
       <p:ext uri="{BB962C8B-B14F-4D97-AF65-F5344CB8AC3E}">
-        <p14:creationId xmlns:p14="http://schemas.microsoft.com/office/powerpoint/2010/main" val="4031715183"/>
+        <p14:creationId xmlns:p14="http://schemas.microsoft.com/office/powerpoint/2010/main" val="650641131"/>
       </p:ext>
     </p:extLst>
   </p:cSld>
@@ -2604,7 +2688,7 @@
           <p:cNvPr id="2" name="Date Placeholder 1">
             <a:extLst>
               <a:ext uri="{FF2B5EF4-FFF2-40B4-BE49-F238E27FC236}">
-                <a16:creationId xmlns:a16="http://schemas.microsoft.com/office/drawing/2014/main" id="{AF258C5C-24B1-15F9-F90F-418B2BD2CE43}"/>
+                <a16:creationId xmlns:a16="http://schemas.microsoft.com/office/drawing/2014/main" id="{309634A3-EEA4-2BB8-8989-0D4FF8F97332}"/>
               </a:ext>
             </a:extLst>
           </p:cNvPr>
@@ -2622,7 +2706,7 @@
           <a:p>
             <a:fld id="{A53D0CF4-1CA0-4C2A-8220-83BA371E72A4}" type="datetimeFigureOut">
               <a:rPr lang="en-US" smtClean="0"/>
-              <a:t>12/3/2025</a:t>
+              <a:t>12/4/2025</a:t>
             </a:fld>
             <a:endParaRPr lang="en-US"/>
           </a:p>
@@ -2633,7 +2717,7 @@
           <p:cNvPr id="3" name="Footer Placeholder 2">
             <a:extLst>
               <a:ext uri="{FF2B5EF4-FFF2-40B4-BE49-F238E27FC236}">
-                <a16:creationId xmlns:a16="http://schemas.microsoft.com/office/drawing/2014/main" id="{21C6F60F-F5D0-F446-B94D-302411D3ACA5}"/>
+                <a16:creationId xmlns:a16="http://schemas.microsoft.com/office/drawing/2014/main" id="{A23A4095-0AE3-D1DE-1332-1CBC61847D1A}"/>
               </a:ext>
             </a:extLst>
           </p:cNvPr>
@@ -2658,7 +2742,7 @@
           <p:cNvPr id="4" name="Slide Number Placeholder 3">
             <a:extLst>
               <a:ext uri="{FF2B5EF4-FFF2-40B4-BE49-F238E27FC236}">
-                <a16:creationId xmlns:a16="http://schemas.microsoft.com/office/drawing/2014/main" id="{29D55487-E7CC-B6D1-400D-B9CDC3A3B0E5}"/>
+                <a16:creationId xmlns:a16="http://schemas.microsoft.com/office/drawing/2014/main" id="{22D87D6C-C241-0B83-4454-054395AA7A50}"/>
               </a:ext>
             </a:extLst>
           </p:cNvPr>
@@ -2685,7 +2769,7 @@
     </p:spTree>
     <p:extLst>
       <p:ext uri="{BB962C8B-B14F-4D97-AF65-F5344CB8AC3E}">
-        <p14:creationId xmlns:p14="http://schemas.microsoft.com/office/powerpoint/2010/main" val="2119732962"/>
+        <p14:creationId xmlns:p14="http://schemas.microsoft.com/office/powerpoint/2010/main" val="2614072905"/>
       </p:ext>
     </p:extLst>
   </p:cSld>
@@ -2717,7 +2801,7 @@
           <p:cNvPr id="2" name="Title 1">
             <a:extLst>
               <a:ext uri="{FF2B5EF4-FFF2-40B4-BE49-F238E27FC236}">
-                <a16:creationId xmlns:a16="http://schemas.microsoft.com/office/drawing/2014/main" id="{D834A0FF-B923-01D9-1AB1-9953CE1C0AB3}"/>
+                <a16:creationId xmlns:a16="http://schemas.microsoft.com/office/drawing/2014/main" id="{D3C1AD1B-CA9E-B32D-E6F5-EA7F971102A9}"/>
               </a:ext>
             </a:extLst>
           </p:cNvPr>
@@ -2754,7 +2838,7 @@
           <p:cNvPr id="3" name="Content Placeholder 2">
             <a:extLst>
               <a:ext uri="{FF2B5EF4-FFF2-40B4-BE49-F238E27FC236}">
-                <a16:creationId xmlns:a16="http://schemas.microsoft.com/office/drawing/2014/main" id="{51A4FD5D-4234-81C4-25C5-D1DE14C7A6B2}"/>
+                <a16:creationId xmlns:a16="http://schemas.microsoft.com/office/drawing/2014/main" id="{DC4769A2-59AB-618E-F8BA-4DE689D0BF7B}"/>
               </a:ext>
             </a:extLst>
           </p:cNvPr>
@@ -2844,7 +2928,7 @@
           <p:cNvPr id="4" name="Text Placeholder 3">
             <a:extLst>
               <a:ext uri="{FF2B5EF4-FFF2-40B4-BE49-F238E27FC236}">
-                <a16:creationId xmlns:a16="http://schemas.microsoft.com/office/drawing/2014/main" id="{545F8EC6-F762-2E8C-F360-C27C8A1BBDDF}"/>
+                <a16:creationId xmlns:a16="http://schemas.microsoft.com/office/drawing/2014/main" id="{C8389B99-9289-DC9A-C6F6-787A10D8B364}"/>
               </a:ext>
             </a:extLst>
           </p:cNvPr>
@@ -2915,7 +2999,7 @@
           <p:cNvPr id="5" name="Date Placeholder 4">
             <a:extLst>
               <a:ext uri="{FF2B5EF4-FFF2-40B4-BE49-F238E27FC236}">
-                <a16:creationId xmlns:a16="http://schemas.microsoft.com/office/drawing/2014/main" id="{A009DEC0-762E-4B67-DE1C-727001EB04E0}"/>
+                <a16:creationId xmlns:a16="http://schemas.microsoft.com/office/drawing/2014/main" id="{05590204-A047-F5DB-0A26-87BDB0DE9236}"/>
               </a:ext>
             </a:extLst>
           </p:cNvPr>
@@ -2933,7 +3017,7 @@
           <a:p>
             <a:fld id="{A53D0CF4-1CA0-4C2A-8220-83BA371E72A4}" type="datetimeFigureOut">
               <a:rPr lang="en-US" smtClean="0"/>
-              <a:t>12/3/2025</a:t>
+              <a:t>12/4/2025</a:t>
             </a:fld>
             <a:endParaRPr lang="en-US"/>
           </a:p>
@@ -2944,7 +3028,7 @@
           <p:cNvPr id="6" name="Footer Placeholder 5">
             <a:extLst>
               <a:ext uri="{FF2B5EF4-FFF2-40B4-BE49-F238E27FC236}">
-                <a16:creationId xmlns:a16="http://schemas.microsoft.com/office/drawing/2014/main" id="{EA23D342-AD60-FB44-C8A5-A5BD4F30DD78}"/>
+                <a16:creationId xmlns:a16="http://schemas.microsoft.com/office/drawing/2014/main" id="{8AB70ADA-E3CB-BEAB-2352-AB7B6E4E83ED}"/>
               </a:ext>
             </a:extLst>
           </p:cNvPr>
@@ -2969,7 +3053,7 @@
           <p:cNvPr id="7" name="Slide Number Placeholder 6">
             <a:extLst>
               <a:ext uri="{FF2B5EF4-FFF2-40B4-BE49-F238E27FC236}">
-                <a16:creationId xmlns:a16="http://schemas.microsoft.com/office/drawing/2014/main" id="{ADA1C5AC-114E-1E1E-210C-DCB0F1F8FB5B}"/>
+                <a16:creationId xmlns:a16="http://schemas.microsoft.com/office/drawing/2014/main" id="{4904BF01-0AFC-F3D4-648E-79D7B43739EF}"/>
               </a:ext>
             </a:extLst>
           </p:cNvPr>
@@ -2996,7 +3080,7 @@
     </p:spTree>
     <p:extLst>
       <p:ext uri="{BB962C8B-B14F-4D97-AF65-F5344CB8AC3E}">
-        <p14:creationId xmlns:p14="http://schemas.microsoft.com/office/powerpoint/2010/main" val="343058263"/>
+        <p14:creationId xmlns:p14="http://schemas.microsoft.com/office/powerpoint/2010/main" val="4062819138"/>
       </p:ext>
     </p:extLst>
   </p:cSld>
@@ -3028,7 +3112,7 @@
           <p:cNvPr id="2" name="Title 1">
             <a:extLst>
               <a:ext uri="{FF2B5EF4-FFF2-40B4-BE49-F238E27FC236}">
-                <a16:creationId xmlns:a16="http://schemas.microsoft.com/office/drawing/2014/main" id="{6FDA98E0-5A7C-1C74-20A9-8104F73201F0}"/>
+                <a16:creationId xmlns:a16="http://schemas.microsoft.com/office/drawing/2014/main" id="{8D3ACE22-3520-9D43-467C-510A4EFA00DB}"/>
               </a:ext>
             </a:extLst>
           </p:cNvPr>
@@ -3065,7 +3149,7 @@
           <p:cNvPr id="3" name="Picture Placeholder 2">
             <a:extLst>
               <a:ext uri="{FF2B5EF4-FFF2-40B4-BE49-F238E27FC236}">
-                <a16:creationId xmlns:a16="http://schemas.microsoft.com/office/drawing/2014/main" id="{284F73F4-C1C2-260A-54E3-42727CBE2019}"/>
+                <a16:creationId xmlns:a16="http://schemas.microsoft.com/office/drawing/2014/main" id="{3FED5ECC-22AF-7152-B2C1-FD667A642E4D}"/>
               </a:ext>
             </a:extLst>
           </p:cNvPr>
@@ -3132,7 +3216,7 @@
           <p:cNvPr id="4" name="Text Placeholder 3">
             <a:extLst>
               <a:ext uri="{FF2B5EF4-FFF2-40B4-BE49-F238E27FC236}">
-                <a16:creationId xmlns:a16="http://schemas.microsoft.com/office/drawing/2014/main" id="{5E3D36EA-4C17-DE16-F28F-7EC2286059A8}"/>
+                <a16:creationId xmlns:a16="http://schemas.microsoft.com/office/drawing/2014/main" id="{D97E276B-F5A8-FB65-1E13-EB586E8EC301}"/>
               </a:ext>
             </a:extLst>
           </p:cNvPr>
@@ -3203,7 +3287,7 @@
           <p:cNvPr id="5" name="Date Placeholder 4">
             <a:extLst>
               <a:ext uri="{FF2B5EF4-FFF2-40B4-BE49-F238E27FC236}">
-                <a16:creationId xmlns:a16="http://schemas.microsoft.com/office/drawing/2014/main" id="{AFC203E9-E270-3A62-844E-67D49ABE9748}"/>
+                <a16:creationId xmlns:a16="http://schemas.microsoft.com/office/drawing/2014/main" id="{BC32FE33-CBA7-9268-B23F-FDA592ECEDD4}"/>
               </a:ext>
             </a:extLst>
           </p:cNvPr>
@@ -3221,7 +3305,7 @@
           <a:p>
             <a:fld id="{A53D0CF4-1CA0-4C2A-8220-83BA371E72A4}" type="datetimeFigureOut">
               <a:rPr lang="en-US" smtClean="0"/>
-              <a:t>12/3/2025</a:t>
+              <a:t>12/4/2025</a:t>
             </a:fld>
             <a:endParaRPr lang="en-US"/>
           </a:p>
@@ -3232,7 +3316,7 @@
           <p:cNvPr id="6" name="Footer Placeholder 5">
             <a:extLst>
               <a:ext uri="{FF2B5EF4-FFF2-40B4-BE49-F238E27FC236}">
-                <a16:creationId xmlns:a16="http://schemas.microsoft.com/office/drawing/2014/main" id="{198F8A0A-99D1-640E-E869-A04962F52BB6}"/>
+                <a16:creationId xmlns:a16="http://schemas.microsoft.com/office/drawing/2014/main" id="{FE4A5CBB-E101-7865-3F1A-3BB9E0B6A2AB}"/>
               </a:ext>
             </a:extLst>
           </p:cNvPr>
@@ -3257,7 +3341,7 @@
           <p:cNvPr id="7" name="Slide Number Placeholder 6">
             <a:extLst>
               <a:ext uri="{FF2B5EF4-FFF2-40B4-BE49-F238E27FC236}">
-                <a16:creationId xmlns:a16="http://schemas.microsoft.com/office/drawing/2014/main" id="{DE9AFA6A-9058-5058-3749-CAAF66EA6C8E}"/>
+                <a16:creationId xmlns:a16="http://schemas.microsoft.com/office/drawing/2014/main" id="{5B15FF26-C2A3-0566-7C0A-5369205E6352}"/>
               </a:ext>
             </a:extLst>
           </p:cNvPr>
@@ -3284,7 +3368,7 @@
     </p:spTree>
     <p:extLst>
       <p:ext uri="{BB962C8B-B14F-4D97-AF65-F5344CB8AC3E}">
-        <p14:creationId xmlns:p14="http://schemas.microsoft.com/office/powerpoint/2010/main" val="3427783273"/>
+        <p14:creationId xmlns:p14="http://schemas.microsoft.com/office/powerpoint/2010/main" val="65252617"/>
       </p:ext>
     </p:extLst>
   </p:cSld>
@@ -3321,7 +3405,7 @@
           <p:cNvPr id="2" name="Title Placeholder 1">
             <a:extLst>
               <a:ext uri="{FF2B5EF4-FFF2-40B4-BE49-F238E27FC236}">
-                <a16:creationId xmlns:a16="http://schemas.microsoft.com/office/drawing/2014/main" id="{36472E9F-2C9C-7E12-BF59-E82D253BC259}"/>
+                <a16:creationId xmlns:a16="http://schemas.microsoft.com/office/drawing/2014/main" id="{DE5A4D83-1B5B-EE71-AD2F-357097E7729B}"/>
               </a:ext>
             </a:extLst>
           </p:cNvPr>
@@ -3359,7 +3443,7 @@
           <p:cNvPr id="3" name="Text Placeholder 2">
             <a:extLst>
               <a:ext uri="{FF2B5EF4-FFF2-40B4-BE49-F238E27FC236}">
-                <a16:creationId xmlns:a16="http://schemas.microsoft.com/office/drawing/2014/main" id="{2B4BA0D7-5ABF-3165-6A1A-9B306404CB86}"/>
+                <a16:creationId xmlns:a16="http://schemas.microsoft.com/office/drawing/2014/main" id="{4B71DCCF-71C8-25B3-F593-C65278AEBF72}"/>
               </a:ext>
             </a:extLst>
           </p:cNvPr>
@@ -3426,7 +3510,7 @@
           <p:cNvPr id="4" name="Date Placeholder 3">
             <a:extLst>
               <a:ext uri="{FF2B5EF4-FFF2-40B4-BE49-F238E27FC236}">
-                <a16:creationId xmlns:a16="http://schemas.microsoft.com/office/drawing/2014/main" id="{9BF8D1DF-7A20-37A9-2AA9-36BDAE501CCF}"/>
+                <a16:creationId xmlns:a16="http://schemas.microsoft.com/office/drawing/2014/main" id="{64593FA7-E301-286F-4032-BE1D19F9064A}"/>
               </a:ext>
             </a:extLst>
           </p:cNvPr>
@@ -3462,7 +3546,7 @@
           <a:p>
             <a:fld id="{A53D0CF4-1CA0-4C2A-8220-83BA371E72A4}" type="datetimeFigureOut">
               <a:rPr lang="en-US" smtClean="0"/>
-              <a:t>12/3/2025</a:t>
+              <a:t>12/4/2025</a:t>
             </a:fld>
             <a:endParaRPr lang="en-US"/>
           </a:p>
@@ -3473,7 +3557,7 @@
           <p:cNvPr id="5" name="Footer Placeholder 4">
             <a:extLst>
               <a:ext uri="{FF2B5EF4-FFF2-40B4-BE49-F238E27FC236}">
-                <a16:creationId xmlns:a16="http://schemas.microsoft.com/office/drawing/2014/main" id="{4E1702EB-5EBB-9A24-12CC-3ECEE51E3785}"/>
+                <a16:creationId xmlns:a16="http://schemas.microsoft.com/office/drawing/2014/main" id="{C5F8B988-0F25-884C-3BC6-B85A0BC3A544}"/>
               </a:ext>
             </a:extLst>
           </p:cNvPr>
@@ -3516,7 +3600,7 @@
           <p:cNvPr id="6" name="Slide Number Placeholder 5">
             <a:extLst>
               <a:ext uri="{FF2B5EF4-FFF2-40B4-BE49-F238E27FC236}">
-                <a16:creationId xmlns:a16="http://schemas.microsoft.com/office/drawing/2014/main" id="{DB266D03-8A05-F77C-9D7E-63DE0526314A}"/>
+                <a16:creationId xmlns:a16="http://schemas.microsoft.com/office/drawing/2014/main" id="{DB90F413-EAC0-873C-6583-440EC9D22866}"/>
               </a:ext>
             </a:extLst>
           </p:cNvPr>
@@ -3561,23 +3645,23 @@
     </p:spTree>
     <p:extLst>
       <p:ext uri="{BB962C8B-B14F-4D97-AF65-F5344CB8AC3E}">
-        <p14:creationId xmlns:p14="http://schemas.microsoft.com/office/powerpoint/2010/main" val="2129245296"/>
+        <p14:creationId xmlns:p14="http://schemas.microsoft.com/office/powerpoint/2010/main" val="663877249"/>
       </p:ext>
     </p:extLst>
   </p:cSld>
   <p:clrMap bg1="lt1" tx1="dk1" bg2="lt2" tx2="dk2" accent1="accent1" accent2="accent2" accent3="accent3" accent4="accent4" accent5="accent5" accent6="accent6" hlink="hlink" folHlink="folHlink"/>
   <p:sldLayoutIdLst>
-    <p:sldLayoutId id="2147483649" r:id="rId1"/>
-    <p:sldLayoutId id="2147483650" r:id="rId2"/>
-    <p:sldLayoutId id="2147483651" r:id="rId3"/>
-    <p:sldLayoutId id="2147483652" r:id="rId4"/>
-    <p:sldLayoutId id="2147483653" r:id="rId5"/>
-    <p:sldLayoutId id="2147483654" r:id="rId6"/>
-    <p:sldLayoutId id="2147483655" r:id="rId7"/>
-    <p:sldLayoutId id="2147483656" r:id="rId8"/>
-    <p:sldLayoutId id="2147483657" r:id="rId9"/>
-    <p:sldLayoutId id="2147483658" r:id="rId10"/>
-    <p:sldLayoutId id="2147483659" r:id="rId11"/>
+    <p:sldLayoutId id="2147483847" r:id="rId1"/>
+    <p:sldLayoutId id="2147483848" r:id="rId2"/>
+    <p:sldLayoutId id="2147483849" r:id="rId3"/>
+    <p:sldLayoutId id="2147483850" r:id="rId4"/>
+    <p:sldLayoutId id="2147483851" r:id="rId5"/>
+    <p:sldLayoutId id="2147483852" r:id="rId6"/>
+    <p:sldLayoutId id="2147483853" r:id="rId7"/>
+    <p:sldLayoutId id="2147483854" r:id="rId8"/>
+    <p:sldLayoutId id="2147483855" r:id="rId9"/>
+    <p:sldLayoutId id="2147483856" r:id="rId10"/>
+    <p:sldLayoutId id="2147483857" r:id="rId11"/>
   </p:sldLayoutIdLst>
   <p:txStyles>
     <p:titleStyle>
@@ -4017,7 +4101,9 @@
         </p:nvSpPr>
         <p:spPr/>
         <p:txBody>
-          <a:bodyPr/>
+          <a:bodyPr>
+            <a:normAutofit/>
+          </a:bodyPr>
           <a:lstStyle/>
           <a:p>
             <a:pPr>
@@ -4210,12 +4296,166 @@
             <p:ph idx="1"/>
           </p:nvPr>
         </p:nvSpPr>
-        <p:spPr/>
-        <p:txBody>
-          <a:bodyPr/>
-          <a:lstStyle/>
-          <a:p>
-            <a:endParaRPr lang="en-US"/>
+        <p:spPr>
+          <a:xfrm>
+            <a:off x="838200" y="1877877"/>
+            <a:ext cx="6304569" cy="1105680"/>
+          </a:xfrm>
+        </p:spPr>
+        <p:txBody>
+          <a:bodyPr/>
+          <a:lstStyle/>
+          <a:p>
+            <a:r>
+              <a:rPr lang="en-US" dirty="0"/>
+              <a:t>Wasserstein Generative Adversarial Networks</a:t>
+            </a:r>
+          </a:p>
+        </p:txBody>
+      </p:sp>
+      <p:pic>
+        <p:nvPicPr>
+          <p:cNvPr id="5" name="Picture 4">
+            <a:extLst>
+              <a:ext uri="{FF2B5EF4-FFF2-40B4-BE49-F238E27FC236}">
+                <a16:creationId xmlns:a16="http://schemas.microsoft.com/office/drawing/2014/main" id="{CA2F9A18-A1A3-B365-38D2-876D939E5AB6}"/>
+              </a:ext>
+            </a:extLst>
+          </p:cNvPr>
+          <p:cNvPicPr>
+            <a:picLocks noChangeAspect="1"/>
+          </p:cNvPicPr>
+          <p:nvPr/>
+        </p:nvPicPr>
+        <p:blipFill>
+          <a:blip r:embed="rId3"/>
+          <a:srcRect l="8645" t="6230" b="8385"/>
+          <a:stretch>
+            <a:fillRect/>
+          </a:stretch>
+        </p:blipFill>
+        <p:spPr>
+          <a:xfrm>
+            <a:off x="6704715" y="146304"/>
+            <a:ext cx="5471188" cy="2837253"/>
+          </a:xfrm>
+          <a:prstGeom prst="rect">
+            <a:avLst/>
+          </a:prstGeom>
+        </p:spPr>
+      </p:pic>
+      <p:sp>
+        <p:nvSpPr>
+          <p:cNvPr id="6" name="TextBox 5">
+            <a:extLst>
+              <a:ext uri="{FF2B5EF4-FFF2-40B4-BE49-F238E27FC236}">
+                <a16:creationId xmlns:a16="http://schemas.microsoft.com/office/drawing/2014/main" id="{D7B03592-01CC-ECE9-7BD4-5FA429C42410}"/>
+              </a:ext>
+            </a:extLst>
+          </p:cNvPr>
+          <p:cNvSpPr txBox="1"/>
+          <p:nvPr/>
+        </p:nvSpPr>
+        <p:spPr>
+          <a:xfrm>
+            <a:off x="838200" y="2905533"/>
+            <a:ext cx="10899648" cy="4318362"/>
+          </a:xfrm>
+          <a:prstGeom prst="rect">
+            <a:avLst/>
+          </a:prstGeom>
+          <a:noFill/>
+        </p:spPr>
+        <p:txBody>
+          <a:bodyPr wrap="square" rtlCol="0">
+            <a:spAutoFit/>
+          </a:bodyPr>
+          <a:lstStyle/>
+          <a:p>
+            <a:pPr marL="285750" indent="-285750">
+              <a:lnSpc>
+                <a:spcPct val="200000"/>
+              </a:lnSpc>
+              <a:buFont typeface="Arial" panose="020B0604020202020204" pitchFamily="34" charset="0"/>
+              <a:buChar char="•"/>
+            </a:pPr>
+            <a:r>
+              <a:rPr lang="en-US" sz="2000" dirty="0"/>
+              <a:t>An evolution from plain GANs, targeting mode collapse/training instability</a:t>
+            </a:r>
+          </a:p>
+          <a:p>
+            <a:pPr marL="285750" indent="-285750">
+              <a:lnSpc>
+                <a:spcPct val="200000"/>
+              </a:lnSpc>
+              <a:buFont typeface="Arial" panose="020B0604020202020204" pitchFamily="34" charset="0"/>
+              <a:buChar char="•"/>
+            </a:pPr>
+            <a:r>
+              <a:rPr lang="en-US" sz="2000" dirty="0"/>
+              <a:t>Steps</a:t>
+            </a:r>
+          </a:p>
+          <a:p>
+            <a:pPr marL="742950" lvl="1" indent="-285750">
+              <a:lnSpc>
+                <a:spcPct val="200000"/>
+              </a:lnSpc>
+              <a:buFont typeface="Arial" panose="020B0604020202020204" pitchFamily="34" charset="0"/>
+              <a:buChar char="•"/>
+            </a:pPr>
+            <a:r>
+              <a:rPr lang="en-US" sz="2000" dirty="0"/>
+              <a:t>Critic: Grade images via WGAN loss function</a:t>
+            </a:r>
+          </a:p>
+          <a:p>
+            <a:pPr marL="742950" lvl="1" indent="-285750">
+              <a:lnSpc>
+                <a:spcPct val="200000"/>
+              </a:lnSpc>
+              <a:buFont typeface="Arial" panose="020B0604020202020204" pitchFamily="34" charset="0"/>
+              <a:buChar char="•"/>
+            </a:pPr>
+            <a:r>
+              <a:rPr lang="en-US" sz="2000" dirty="0"/>
+              <a:t>Generator: Create images that Critic rates highly</a:t>
+            </a:r>
+          </a:p>
+          <a:p>
+            <a:pPr marL="285750" indent="-285750">
+              <a:lnSpc>
+                <a:spcPct val="200000"/>
+              </a:lnSpc>
+              <a:buFont typeface="Arial" panose="020B0604020202020204" pitchFamily="34" charset="0"/>
+              <a:buChar char="•"/>
+            </a:pPr>
+            <a:r>
+              <a:rPr lang="en-US" sz="2000" dirty="0"/>
+              <a:t>Discriminator is more useful in WGANs</a:t>
+            </a:r>
+          </a:p>
+          <a:p>
+            <a:pPr marL="285750" indent="-285750">
+              <a:lnSpc>
+                <a:spcPct val="200000"/>
+              </a:lnSpc>
+              <a:buFont typeface="Arial" panose="020B0604020202020204" pitchFamily="34" charset="0"/>
+              <a:buChar char="•"/>
+            </a:pPr>
+            <a:r>
+              <a:rPr lang="en-US" sz="2000" dirty="0"/>
+              <a:t>Quicker training &amp; inference times w/ quality images</a:t>
+            </a:r>
+          </a:p>
+          <a:p>
+            <a:pPr>
+              <a:lnSpc>
+                <a:spcPct val="200000"/>
+              </a:lnSpc>
+            </a:pPr>
+            <a:endParaRPr lang="en-US" sz="2000" dirty="0"/>
           </a:p>
         </p:txBody>
       </p:sp>
@@ -4295,7 +4535,9 @@
         </p:nvSpPr>
         <p:spPr/>
         <p:txBody>
-          <a:bodyPr/>
+          <a:bodyPr>
+            <a:normAutofit/>
+          </a:bodyPr>
           <a:lstStyle/>
           <a:p>
             <a:r>

</xml_diff>